<commit_message>
updates in the code of ChaptGPT
</commit_message>
<xml_diff>
--- a/teaching/CS472/Timetable/LLM.pptx
+++ b/teaching/CS472/Timetable/LLM.pptx
@@ -5,13 +5,15 @@
     <p:sldMasterId id="2147483648" r:id="rId1"/>
   </p:sldMasterIdLst>
   <p:notesMasterIdLst>
-    <p:notesMasterId r:id="rId6"/>
+    <p:notesMasterId r:id="rId8"/>
   </p:notesMasterIdLst>
   <p:sldIdLst>
     <p:sldId id="256" r:id="rId2"/>
     <p:sldId id="257" r:id="rId3"/>
     <p:sldId id="258" r:id="rId4"/>
     <p:sldId id="259" r:id="rId5"/>
+    <p:sldId id="261" r:id="rId6"/>
+    <p:sldId id="260" r:id="rId7"/>
   </p:sldIdLst>
   <p:sldSz cx="12192000" cy="6858000"/>
   <p:notesSz cx="6858000" cy="9144000"/>
@@ -4860,370 +4862,125 @@
             <p:ph type="title"/>
           </p:nvPr>
         </p:nvSpPr>
-        <p:spPr/>
-        <p:txBody>
-          <a:bodyPr/>
-          <a:lstStyle/>
-          <a:p>
-            <a:r>
-              <a:rPr lang="en-US" dirty="0"/>
-              <a:t>Utilization of LLM for in SE Tasks</a:t>
-            </a:r>
-          </a:p>
-        </p:txBody>
-      </p:sp>
-      <p:sp>
-        <p:nvSpPr>
-          <p:cNvPr id="3" name="Content Placeholder 2">
-            <a:extLst>
-              <a:ext uri="{FF2B5EF4-FFF2-40B4-BE49-F238E27FC236}">
-                <a16:creationId xmlns:a16="http://schemas.microsoft.com/office/drawing/2014/main" id="{05E725CE-C9F1-CF0B-8849-EA90B481E99A}"/>
-              </a:ext>
-            </a:extLst>
-          </p:cNvPr>
-          <p:cNvSpPr>
-            <a:spLocks noGrp="1"/>
-          </p:cNvSpPr>
-          <p:nvPr>
-            <p:ph idx="1"/>
-          </p:nvPr>
-        </p:nvSpPr>
         <p:spPr>
           <a:xfrm>
-            <a:off x="665921" y="1838877"/>
-            <a:ext cx="5208105" cy="4351338"/>
+            <a:off x="291548" y="208144"/>
+            <a:ext cx="11353800" cy="874643"/>
           </a:xfrm>
         </p:spPr>
         <p:txBody>
           <a:bodyPr>
-            <a:normAutofit/>
+            <a:noAutofit/>
           </a:bodyPr>
           <a:lstStyle/>
           <a:p>
             <a:r>
-              <a:rPr lang="en-US" dirty="0"/>
-              <a:t>Requirements Engineering</a:t>
-            </a:r>
-          </a:p>
-          <a:p>
-            <a:pPr lvl="1"/>
-            <a:r>
-              <a:rPr lang="en-US" dirty="0"/>
-              <a:t>Requirements classification</a:t>
-            </a:r>
-          </a:p>
-          <a:p>
-            <a:pPr lvl="1"/>
-            <a:r>
-              <a:rPr lang="en-US" dirty="0"/>
-              <a:t>Traceability automation</a:t>
-            </a:r>
-          </a:p>
-          <a:p>
-            <a:r>
-              <a:rPr lang="en-US" dirty="0"/>
-              <a:t>Software Design</a:t>
-            </a:r>
-          </a:p>
-          <a:p>
-            <a:pPr lvl="1"/>
-            <a:r>
-              <a:rPr lang="en-US" dirty="0"/>
-              <a:t>GUI retrieval</a:t>
-            </a:r>
-          </a:p>
-          <a:p>
-            <a:pPr lvl="1"/>
-            <a:r>
-              <a:rPr lang="en-US" dirty="0"/>
-              <a:t>Rapid prototyping</a:t>
-            </a:r>
-          </a:p>
-          <a:p>
-            <a:r>
-              <a:rPr lang="en-US" dirty="0"/>
-              <a:t>Software Development</a:t>
-            </a:r>
-          </a:p>
-          <a:p>
-            <a:pPr lvl="1"/>
-            <a:r>
-              <a:rPr lang="en-US" dirty="0"/>
-              <a:t>Code generation</a:t>
-            </a:r>
-          </a:p>
-          <a:p>
-            <a:pPr lvl="1"/>
-            <a:r>
-              <a:rPr lang="en-US" dirty="0"/>
-              <a:t>Code understanding</a:t>
-            </a:r>
-          </a:p>
-          <a:p>
-            <a:pPr lvl="1"/>
-            <a:r>
-              <a:rPr lang="en-US" dirty="0"/>
-              <a:t>Code search</a:t>
-            </a:r>
-          </a:p>
-        </p:txBody>
-      </p:sp>
-      <p:sp>
-        <p:nvSpPr>
-          <p:cNvPr id="4" name="Content Placeholder 2">
-            <a:extLst>
-              <a:ext uri="{FF2B5EF4-FFF2-40B4-BE49-F238E27FC236}">
-                <a16:creationId xmlns:a16="http://schemas.microsoft.com/office/drawing/2014/main" id="{D26CE0B9-8F5E-4C58-5DAA-5A712CFDD74A}"/>
-              </a:ext>
-            </a:extLst>
-          </p:cNvPr>
-          <p:cNvSpPr txBox="1">
-            <a:spLocks/>
-          </p:cNvSpPr>
-          <p:nvPr/>
-        </p:nvSpPr>
+              <a:rPr lang="en-US" sz="3600" dirty="0"/>
+              <a:t>What SE Tasks have been addressed to date using LLM4SE</a:t>
+            </a:r>
+          </a:p>
+        </p:txBody>
+      </p:sp>
+      <p:pic>
+        <p:nvPicPr>
+          <p:cNvPr id="7" name="Content Placeholder 4" descr="A table with text on it&#10;&#10;Description automatically generated">
+            <a:extLst>
+              <a:ext uri="{FF2B5EF4-FFF2-40B4-BE49-F238E27FC236}">
+                <a16:creationId xmlns:a16="http://schemas.microsoft.com/office/drawing/2014/main" id="{38C4491F-10C6-F0D8-6727-9E5384A8339A}"/>
+              </a:ext>
+            </a:extLst>
+          </p:cNvPr>
+          <p:cNvPicPr>
+            <a:picLocks noGrp="1" noChangeAspect="1"/>
+          </p:cNvPicPr>
+          <p:nvPr>
+            <p:ph idx="1"/>
+          </p:nvPr>
+        </p:nvPicPr>
+        <p:blipFill rotWithShape="1">
+          <a:blip r:embed="rId3"/>
+          <a:srcRect t="7504"/>
+          <a:stretch/>
+        </p:blipFill>
         <p:spPr>
           <a:xfrm>
-            <a:off x="6317974" y="1838877"/>
-            <a:ext cx="5582478" cy="4351338"/>
+            <a:off x="0" y="1152938"/>
+            <a:ext cx="7622286" cy="5671931"/>
+          </a:xfrm>
+        </p:spPr>
+      </p:pic>
+      <p:sp>
+        <p:nvSpPr>
+          <p:cNvPr id="8" name="TextBox 7">
+            <a:extLst>
+              <a:ext uri="{FF2B5EF4-FFF2-40B4-BE49-F238E27FC236}">
+                <a16:creationId xmlns:a16="http://schemas.microsoft.com/office/drawing/2014/main" id="{36F3D8FA-3512-8EE5-4908-9E1AD898FD28}"/>
+              </a:ext>
+            </a:extLst>
+          </p:cNvPr>
+          <p:cNvSpPr txBox="1"/>
+          <p:nvPr/>
+        </p:nvSpPr>
+        <p:spPr>
+          <a:xfrm>
+            <a:off x="7182678" y="2718208"/>
+            <a:ext cx="4757532" cy="1323439"/>
           </a:xfrm>
           <a:prstGeom prst="rect">
             <a:avLst/>
           </a:prstGeom>
+          <a:noFill/>
+          <a:ln w="19050">
+            <a:solidFill>
+              <a:srgbClr val="C00000"/>
+            </a:solidFill>
+          </a:ln>
         </p:spPr>
         <p:txBody>
-          <a:bodyPr vert="horz" lIns="91440" tIns="45720" rIns="91440" bIns="45720" rtlCol="0">
-            <a:normAutofit/>
+          <a:bodyPr wrap="square" rtlCol="0">
+            <a:spAutoFit/>
           </a:bodyPr>
-          <a:lstStyle>
-            <a:lvl1pPr marL="228600" indent="-228600" algn="l" defTabSz="914400" rtl="0" eaLnBrk="1" latinLnBrk="0" hangingPunct="1">
-              <a:lnSpc>
-                <a:spcPct val="90000"/>
-              </a:lnSpc>
-              <a:spcBef>
-                <a:spcPts val="1000"/>
-              </a:spcBef>
+          <a:lstStyle/>
+          <a:p>
+            <a:r>
+              <a:rPr lang="en-US" sz="1600" dirty="0"/>
+              <a:t>Hou et al. LLMs for SE: A Systematic Literature Review</a:t>
+            </a:r>
+          </a:p>
+          <a:p>
+            <a:pPr marL="285750" indent="-285750">
               <a:buFont typeface="Arial" panose="020B0604020202020204" pitchFamily="34" charset="0"/>
               <a:buChar char="•"/>
-              <a:defRPr sz="2800" kern="1200">
-                <a:solidFill>
-                  <a:schemeClr val="tx1"/>
-                </a:solidFill>
-                <a:latin typeface="+mn-lt"/>
-                <a:ea typeface="+mn-ea"/>
-                <a:cs typeface="+mn-cs"/>
-              </a:defRPr>
-            </a:lvl1pPr>
-            <a:lvl2pPr marL="685800" indent="-228600" algn="l" defTabSz="914400" rtl="0" eaLnBrk="1" latinLnBrk="0" hangingPunct="1">
-              <a:lnSpc>
-                <a:spcPct val="90000"/>
-              </a:lnSpc>
-              <a:spcBef>
-                <a:spcPts val="500"/>
-              </a:spcBef>
+            </a:pPr>
+            <a:r>
+              <a:rPr lang="en-US" sz="1600" dirty="0">
+                <a:hlinkClick r:id="rId4"/>
+              </a:rPr>
+              <a:t>https://arxiv.org/pdf/2308.10620.pdf</a:t>
+            </a:r>
+            <a:r>
+              <a:rPr lang="en-US" sz="1600" dirty="0"/>
+              <a:t> </a:t>
+            </a:r>
+          </a:p>
+          <a:p>
+            <a:pPr marL="285750" indent="-285750">
               <a:buFont typeface="Arial" panose="020B0604020202020204" pitchFamily="34" charset="0"/>
               <a:buChar char="•"/>
-              <a:defRPr sz="2400" kern="1200">
-                <a:solidFill>
-                  <a:schemeClr val="tx1"/>
-                </a:solidFill>
-                <a:latin typeface="+mn-lt"/>
-                <a:ea typeface="+mn-ea"/>
-                <a:cs typeface="+mn-cs"/>
-              </a:defRPr>
-            </a:lvl2pPr>
-            <a:lvl3pPr marL="1143000" indent="-228600" algn="l" defTabSz="914400" rtl="0" eaLnBrk="1" latinLnBrk="0" hangingPunct="1">
-              <a:lnSpc>
-                <a:spcPct val="90000"/>
-              </a:lnSpc>
-              <a:spcBef>
-                <a:spcPts val="500"/>
-              </a:spcBef>
+            </a:pPr>
+            <a:r>
+              <a:rPr lang="en-US" sz="1600" dirty="0"/>
+              <a:t>Analyzed 229 research papers on the subject</a:t>
+            </a:r>
+          </a:p>
+          <a:p>
+            <a:pPr marL="285750" indent="-285750">
               <a:buFont typeface="Arial" panose="020B0604020202020204" pitchFamily="34" charset="0"/>
               <a:buChar char="•"/>
-              <a:defRPr sz="2000" kern="1200">
-                <a:solidFill>
-                  <a:schemeClr val="tx1"/>
-                </a:solidFill>
-                <a:latin typeface="+mn-lt"/>
-                <a:ea typeface="+mn-ea"/>
-                <a:cs typeface="+mn-cs"/>
-              </a:defRPr>
-            </a:lvl3pPr>
-            <a:lvl4pPr marL="1600200" indent="-228600" algn="l" defTabSz="914400" rtl="0" eaLnBrk="1" latinLnBrk="0" hangingPunct="1">
-              <a:lnSpc>
-                <a:spcPct val="90000"/>
-              </a:lnSpc>
-              <a:spcBef>
-                <a:spcPts val="500"/>
-              </a:spcBef>
-              <a:buFont typeface="Arial" panose="020B0604020202020204" pitchFamily="34" charset="0"/>
-              <a:buChar char="•"/>
-              <a:defRPr sz="1800" kern="1200">
-                <a:solidFill>
-                  <a:schemeClr val="tx1"/>
-                </a:solidFill>
-                <a:latin typeface="+mn-lt"/>
-                <a:ea typeface="+mn-ea"/>
-                <a:cs typeface="+mn-cs"/>
-              </a:defRPr>
-            </a:lvl4pPr>
-            <a:lvl5pPr marL="2057400" indent="-228600" algn="l" defTabSz="914400" rtl="0" eaLnBrk="1" latinLnBrk="0" hangingPunct="1">
-              <a:lnSpc>
-                <a:spcPct val="90000"/>
-              </a:lnSpc>
-              <a:spcBef>
-                <a:spcPts val="500"/>
-              </a:spcBef>
-              <a:buFont typeface="Arial" panose="020B0604020202020204" pitchFamily="34" charset="0"/>
-              <a:buChar char="•"/>
-              <a:defRPr sz="1800" kern="1200">
-                <a:solidFill>
-                  <a:schemeClr val="tx1"/>
-                </a:solidFill>
-                <a:latin typeface="+mn-lt"/>
-                <a:ea typeface="+mn-ea"/>
-                <a:cs typeface="+mn-cs"/>
-              </a:defRPr>
-            </a:lvl5pPr>
-            <a:lvl6pPr marL="2514600" indent="-228600" algn="l" defTabSz="914400" rtl="0" eaLnBrk="1" latinLnBrk="0" hangingPunct="1">
-              <a:lnSpc>
-                <a:spcPct val="90000"/>
-              </a:lnSpc>
-              <a:spcBef>
-                <a:spcPts val="500"/>
-              </a:spcBef>
-              <a:buFont typeface="Arial" panose="020B0604020202020204" pitchFamily="34" charset="0"/>
-              <a:buChar char="•"/>
-              <a:defRPr sz="1800" kern="1200">
-                <a:solidFill>
-                  <a:schemeClr val="tx1"/>
-                </a:solidFill>
-                <a:latin typeface="+mn-lt"/>
-                <a:ea typeface="+mn-ea"/>
-                <a:cs typeface="+mn-cs"/>
-              </a:defRPr>
-            </a:lvl6pPr>
-            <a:lvl7pPr marL="2971800" indent="-228600" algn="l" defTabSz="914400" rtl="0" eaLnBrk="1" latinLnBrk="0" hangingPunct="1">
-              <a:lnSpc>
-                <a:spcPct val="90000"/>
-              </a:lnSpc>
-              <a:spcBef>
-                <a:spcPts val="500"/>
-              </a:spcBef>
-              <a:buFont typeface="Arial" panose="020B0604020202020204" pitchFamily="34" charset="0"/>
-              <a:buChar char="•"/>
-              <a:defRPr sz="1800" kern="1200">
-                <a:solidFill>
-                  <a:schemeClr val="tx1"/>
-                </a:solidFill>
-                <a:latin typeface="+mn-lt"/>
-                <a:ea typeface="+mn-ea"/>
-                <a:cs typeface="+mn-cs"/>
-              </a:defRPr>
-            </a:lvl7pPr>
-            <a:lvl8pPr marL="3429000" indent="-228600" algn="l" defTabSz="914400" rtl="0" eaLnBrk="1" latinLnBrk="0" hangingPunct="1">
-              <a:lnSpc>
-                <a:spcPct val="90000"/>
-              </a:lnSpc>
-              <a:spcBef>
-                <a:spcPts val="500"/>
-              </a:spcBef>
-              <a:buFont typeface="Arial" panose="020B0604020202020204" pitchFamily="34" charset="0"/>
-              <a:buChar char="•"/>
-              <a:defRPr sz="1800" kern="1200">
-                <a:solidFill>
-                  <a:schemeClr val="tx1"/>
-                </a:solidFill>
-                <a:latin typeface="+mn-lt"/>
-                <a:ea typeface="+mn-ea"/>
-                <a:cs typeface="+mn-cs"/>
-              </a:defRPr>
-            </a:lvl8pPr>
-            <a:lvl9pPr marL="3886200" indent="-228600" algn="l" defTabSz="914400" rtl="0" eaLnBrk="1" latinLnBrk="0" hangingPunct="1">
-              <a:lnSpc>
-                <a:spcPct val="90000"/>
-              </a:lnSpc>
-              <a:spcBef>
-                <a:spcPts val="500"/>
-              </a:spcBef>
-              <a:buFont typeface="Arial" panose="020B0604020202020204" pitchFamily="34" charset="0"/>
-              <a:buChar char="•"/>
-              <a:defRPr sz="1800" kern="1200">
-                <a:solidFill>
-                  <a:schemeClr val="tx1"/>
-                </a:solidFill>
-                <a:latin typeface="+mn-lt"/>
-                <a:ea typeface="+mn-ea"/>
-                <a:cs typeface="+mn-cs"/>
-              </a:defRPr>
-            </a:lvl9pPr>
-          </a:lstStyle>
-          <a:p>
-            <a:r>
-              <a:rPr lang="en-US" dirty="0"/>
-              <a:t>Software Quality Assurance</a:t>
-            </a:r>
-          </a:p>
-          <a:p>
-            <a:pPr lvl="1"/>
-            <a:r>
-              <a:rPr lang="en-US" dirty="0"/>
-              <a:t>Test generation</a:t>
-            </a:r>
-          </a:p>
-          <a:p>
-            <a:pPr lvl="1"/>
-            <a:r>
-              <a:rPr lang="en-US" dirty="0"/>
-              <a:t>Test automation</a:t>
-            </a:r>
-          </a:p>
-          <a:p>
-            <a:pPr lvl="1"/>
-            <a:r>
-              <a:rPr lang="en-US" dirty="0"/>
-              <a:t>Failure-inducing test identification</a:t>
-            </a:r>
-          </a:p>
-          <a:p>
-            <a:r>
-              <a:rPr lang="en-US" dirty="0"/>
-              <a:t>Software Maintenance</a:t>
-            </a:r>
-          </a:p>
-          <a:p>
-            <a:pPr lvl="1"/>
-            <a:r>
-              <a:rPr lang="en-US" dirty="0"/>
-              <a:t>Code review</a:t>
-            </a:r>
-          </a:p>
-          <a:p>
-            <a:pPr lvl="1"/>
-            <a:r>
-              <a:rPr lang="en-US" dirty="0"/>
-              <a:t>Debugging</a:t>
-            </a:r>
-          </a:p>
-          <a:p>
-            <a:pPr lvl="1"/>
-            <a:r>
-              <a:rPr lang="en-US" dirty="0"/>
-              <a:t>Program repair</a:t>
-            </a:r>
-          </a:p>
-          <a:p>
-            <a:r>
-              <a:rPr lang="en-US" dirty="0"/>
-              <a:t>Software management</a:t>
-            </a:r>
-          </a:p>
-          <a:p>
-            <a:pPr lvl="1"/>
-            <a:r>
-              <a:rPr lang="en-US" dirty="0"/>
-              <a:t>Effort estimation</a:t>
+            </a:pPr>
+            <a:r>
+              <a:rPr lang="en-US" sz="1600" dirty="0"/>
+              <a:t>Read Chapter 6 of the paper to find which papers have addressed the SE tasks.</a:t>
             </a:r>
           </a:p>
         </p:txBody>
@@ -5281,8 +5038,8 @@
         </p:blipFill>
         <p:spPr>
           <a:xfrm>
-            <a:off x="2637183" y="2080591"/>
-            <a:ext cx="5032074" cy="3451846"/>
+            <a:off x="1323497" y="1179443"/>
+            <a:ext cx="6345760" cy="4352994"/>
           </a:xfrm>
         </p:spPr>
       </p:pic>
@@ -5304,17 +5061,19 @@
         </p:nvSpPr>
         <p:spPr>
           <a:xfrm>
-            <a:off x="639418" y="0"/>
-            <a:ext cx="10515600" cy="1325563"/>
+            <a:off x="639417" y="0"/>
+            <a:ext cx="11169317" cy="1325563"/>
           </a:xfrm>
         </p:spPr>
         <p:txBody>
-          <a:bodyPr/>
-          <a:lstStyle/>
-          <a:p>
-            <a:r>
-              <a:rPr lang="en-US" dirty="0"/>
-              <a:t>Utilization of LLM for in SE Tasks</a:t>
+          <a:bodyPr>
+            <a:normAutofit/>
+          </a:bodyPr>
+          <a:lstStyle/>
+          <a:p>
+            <a:r>
+              <a:rPr lang="en-US" sz="3600" dirty="0"/>
+              <a:t>What SE Tasks have been addressed to date using LLM4SE</a:t>
             </a:r>
           </a:p>
         </p:txBody>
@@ -5334,7 +5093,7 @@
         <p:spPr>
           <a:xfrm>
             <a:off x="383264" y="5656375"/>
-            <a:ext cx="11425471" cy="707886"/>
+            <a:ext cx="11425471" cy="400110"/>
           </a:xfrm>
           <a:prstGeom prst="rect">
             <a:avLst/>
@@ -5355,68 +5114,6 @@
             <a:r>
               <a:rPr lang="en-US" sz="2000" dirty="0"/>
               <a:t>58.37% in software development showcases the significance of LLMs in producing code or text</a:t>
-            </a:r>
-          </a:p>
-          <a:p>
-            <a:pPr marL="342900" indent="-342900">
-              <a:buFont typeface="Arial" panose="020B0604020202020204" pitchFamily="34" charset="0"/>
-              <a:buChar char="•"/>
-            </a:pPr>
-            <a:r>
-              <a:rPr lang="en-US" sz="2000" dirty="0"/>
-              <a:t>Read Chapter 6 of paper by Hou et al. to find papers that have used LLMs to solve the SE tasks.</a:t>
-            </a:r>
-          </a:p>
-        </p:txBody>
-      </p:sp>
-      <p:sp>
-        <p:nvSpPr>
-          <p:cNvPr id="9" name="TextBox 8">
-            <a:extLst>
-              <a:ext uri="{FF2B5EF4-FFF2-40B4-BE49-F238E27FC236}">
-                <a16:creationId xmlns:a16="http://schemas.microsoft.com/office/drawing/2014/main" id="{5F34C26E-C615-A509-11D8-B2DCA8242572}"/>
-              </a:ext>
-            </a:extLst>
-          </p:cNvPr>
-          <p:cNvSpPr txBox="1"/>
-          <p:nvPr/>
-        </p:nvSpPr>
-        <p:spPr>
-          <a:xfrm>
-            <a:off x="639418" y="1325563"/>
-            <a:ext cx="9856304" cy="646331"/>
-          </a:xfrm>
-          <a:prstGeom prst="rect">
-            <a:avLst/>
-          </a:prstGeom>
-          <a:noFill/>
-        </p:spPr>
-        <p:txBody>
-          <a:bodyPr wrap="square" rtlCol="0">
-            <a:spAutoFit/>
-          </a:bodyPr>
-          <a:lstStyle/>
-          <a:p>
-            <a:r>
-              <a:rPr lang="en-US" dirty="0"/>
-              <a:t>Hou et al. LLMs for SE: A Systematic Literature Review - </a:t>
-            </a:r>
-            <a:r>
-              <a:rPr lang="en-US" dirty="0">
-                <a:hlinkClick r:id="rId3"/>
-              </a:rPr>
-              <a:t>https://arxiv.org/pdf/2308.10620.pdf</a:t>
-            </a:r>
-            <a:r>
-              <a:rPr lang="en-US" dirty="0"/>
-              <a:t> </a:t>
-            </a:r>
-          </a:p>
-          <a:p>
-            <a:pPr lvl="1"/>
-            <a:r>
-              <a:rPr lang="en-US" dirty="0"/>
-              <a:t>-  Analyzed 229 research papers on the subject</a:t>
             </a:r>
           </a:p>
         </p:txBody>
@@ -5509,6 +5206,220 @@
       <p:bldP spid="8" grpId="0"/>
     </p:bldLst>
   </p:timing>
+</p:sld>
+</file>
+
+<file path=ppt/slides/slide5.xml><?xml version="1.0" encoding="utf-8"?>
+<p:sld xmlns:a="http://schemas.openxmlformats.org/drawingml/2006/main" xmlns:r="http://schemas.openxmlformats.org/officeDocument/2006/relationships" xmlns:p="http://schemas.openxmlformats.org/presentationml/2006/main">
+  <p:cSld>
+    <p:spTree>
+      <p:nvGrpSpPr>
+        <p:cNvPr id="1" name=""/>
+        <p:cNvGrpSpPr/>
+        <p:nvPr/>
+      </p:nvGrpSpPr>
+      <p:grpSpPr>
+        <a:xfrm>
+          <a:off x="0" y="0"/>
+          <a:ext cx="0" cy="0"/>
+          <a:chOff x="0" y="0"/>
+          <a:chExt cx="0" cy="0"/>
+        </a:xfrm>
+      </p:grpSpPr>
+      <p:sp>
+        <p:nvSpPr>
+          <p:cNvPr id="6" name="Title 1">
+            <a:extLst>
+              <a:ext uri="{FF2B5EF4-FFF2-40B4-BE49-F238E27FC236}">
+                <a16:creationId xmlns:a16="http://schemas.microsoft.com/office/drawing/2014/main" id="{25A082F2-F51D-C1CC-A0DD-EA7C5A31D3BF}"/>
+              </a:ext>
+            </a:extLst>
+          </p:cNvPr>
+          <p:cNvSpPr>
+            <a:spLocks noGrp="1"/>
+          </p:cNvSpPr>
+          <p:nvPr>
+            <p:ph type="title"/>
+          </p:nvPr>
+        </p:nvSpPr>
+        <p:spPr>
+          <a:xfrm>
+            <a:off x="639418" y="0"/>
+            <a:ext cx="10515600" cy="1325563"/>
+          </a:xfrm>
+        </p:spPr>
+        <p:txBody>
+          <a:bodyPr/>
+          <a:lstStyle/>
+          <a:p>
+            <a:r>
+              <a:rPr lang="en-US" dirty="0"/>
+              <a:t>Utilization of LLM for in SE Tasks</a:t>
+            </a:r>
+          </a:p>
+        </p:txBody>
+      </p:sp>
+      <p:sp>
+        <p:nvSpPr>
+          <p:cNvPr id="8" name="TextBox 7">
+            <a:extLst>
+              <a:ext uri="{FF2B5EF4-FFF2-40B4-BE49-F238E27FC236}">
+                <a16:creationId xmlns:a16="http://schemas.microsoft.com/office/drawing/2014/main" id="{8C101F80-0179-675C-C594-15D0D2855B67}"/>
+              </a:ext>
+            </a:extLst>
+          </p:cNvPr>
+          <p:cNvSpPr txBox="1"/>
+          <p:nvPr/>
+        </p:nvSpPr>
+        <p:spPr>
+          <a:xfrm>
+            <a:off x="1179443" y="1260684"/>
+            <a:ext cx="4916557" cy="369332"/>
+          </a:xfrm>
+          <a:prstGeom prst="rect">
+            <a:avLst/>
+          </a:prstGeom>
+          <a:noFill/>
+        </p:spPr>
+        <p:txBody>
+          <a:bodyPr wrap="square">
+            <a:spAutoFit/>
+          </a:bodyPr>
+          <a:lstStyle/>
+          <a:p>
+            <a:r>
+              <a:rPr lang="en-GB" dirty="0">
+                <a:effectLst/>
+                <a:latin typeface="Helvetica" pitchFamily="2" charset="0"/>
+              </a:rPr>
+              <a:t>Distribution of SE tasks over six SE activities.</a:t>
+            </a:r>
+          </a:p>
+        </p:txBody>
+      </p:sp>
+      <p:sp>
+        <p:nvSpPr>
+          <p:cNvPr id="10" name="Content Placeholder 9">
+            <a:extLst>
+              <a:ext uri="{FF2B5EF4-FFF2-40B4-BE49-F238E27FC236}">
+                <a16:creationId xmlns:a16="http://schemas.microsoft.com/office/drawing/2014/main" id="{30B359DF-7DC3-7875-1B2C-178636E92E51}"/>
+              </a:ext>
+            </a:extLst>
+          </p:cNvPr>
+          <p:cNvSpPr>
+            <a:spLocks noGrp="1"/>
+          </p:cNvSpPr>
+          <p:nvPr>
+            <p:ph idx="1"/>
+          </p:nvPr>
+        </p:nvSpPr>
+        <p:spPr/>
+        <p:txBody>
+          <a:bodyPr/>
+          <a:lstStyle/>
+          <a:p>
+            <a:endParaRPr lang="en-US"/>
+          </a:p>
+        </p:txBody>
+      </p:sp>
+    </p:spTree>
+    <p:extLst>
+      <p:ext uri="{BB962C8B-B14F-4D97-AF65-F5344CB8AC3E}">
+        <p14:creationId xmlns:p14="http://schemas.microsoft.com/office/powerpoint/2010/main" val="1779863854"/>
+      </p:ext>
+    </p:extLst>
+  </p:cSld>
+  <p:clrMapOvr>
+    <a:masterClrMapping/>
+  </p:clrMapOvr>
+</p:sld>
+</file>
+
+<file path=ppt/slides/slide6.xml><?xml version="1.0" encoding="utf-8"?>
+<p:sld xmlns:a="http://schemas.openxmlformats.org/drawingml/2006/main" xmlns:r="http://schemas.openxmlformats.org/officeDocument/2006/relationships" xmlns:p="http://schemas.openxmlformats.org/presentationml/2006/main">
+  <p:cSld>
+    <p:spTree>
+      <p:nvGrpSpPr>
+        <p:cNvPr id="1" name=""/>
+        <p:cNvGrpSpPr/>
+        <p:nvPr/>
+      </p:nvGrpSpPr>
+      <p:grpSpPr>
+        <a:xfrm>
+          <a:off x="0" y="0"/>
+          <a:ext cx="0" cy="0"/>
+          <a:chOff x="0" y="0"/>
+          <a:chExt cx="0" cy="0"/>
+        </a:xfrm>
+      </p:grpSpPr>
+      <p:sp>
+        <p:nvSpPr>
+          <p:cNvPr id="2" name="Title 1">
+            <a:extLst>
+              <a:ext uri="{FF2B5EF4-FFF2-40B4-BE49-F238E27FC236}">
+                <a16:creationId xmlns:a16="http://schemas.microsoft.com/office/drawing/2014/main" id="{FA1B5C28-CA92-AA38-6D96-FEAE4E8BB3DD}"/>
+              </a:ext>
+            </a:extLst>
+          </p:cNvPr>
+          <p:cNvSpPr>
+            <a:spLocks noGrp="1"/>
+          </p:cNvSpPr>
+          <p:nvPr>
+            <p:ph type="title"/>
+          </p:nvPr>
+        </p:nvSpPr>
+        <p:spPr/>
+        <p:txBody>
+          <a:bodyPr/>
+          <a:lstStyle/>
+          <a:p>
+            <a:r>
+              <a:rPr lang="en-US" dirty="0"/>
+              <a:t>We will study how developers use </a:t>
+            </a:r>
+            <a:r>
+              <a:rPr lang="en-US" dirty="0" err="1"/>
+              <a:t>ChatGPT</a:t>
+            </a:r>
+            <a:endParaRPr lang="en-US" dirty="0"/>
+          </a:p>
+        </p:txBody>
+      </p:sp>
+      <p:sp>
+        <p:nvSpPr>
+          <p:cNvPr id="3" name="Content Placeholder 2">
+            <a:extLst>
+              <a:ext uri="{FF2B5EF4-FFF2-40B4-BE49-F238E27FC236}">
+                <a16:creationId xmlns:a16="http://schemas.microsoft.com/office/drawing/2014/main" id="{5D071941-3366-7A44-96F1-06D1CBC6AED1}"/>
+              </a:ext>
+            </a:extLst>
+          </p:cNvPr>
+          <p:cNvSpPr>
+            <a:spLocks noGrp="1"/>
+          </p:cNvSpPr>
+          <p:nvPr>
+            <p:ph idx="1"/>
+          </p:nvPr>
+        </p:nvSpPr>
+        <p:spPr/>
+        <p:txBody>
+          <a:bodyPr/>
+          <a:lstStyle/>
+          <a:p>
+            <a:endParaRPr lang="en-US"/>
+          </a:p>
+        </p:txBody>
+      </p:sp>
+    </p:spTree>
+    <p:extLst>
+      <p:ext uri="{BB962C8B-B14F-4D97-AF65-F5344CB8AC3E}">
+        <p14:creationId xmlns:p14="http://schemas.microsoft.com/office/powerpoint/2010/main" val="1206998922"/>
+      </p:ext>
+    </p:extLst>
+  </p:cSld>
+  <p:clrMapOvr>
+    <a:masterClrMapping/>
+  </p:clrMapOvr>
 </p:sld>
 </file>
 

</xml_diff>

<commit_message>
deploying the changes in the PR from Daniel
</commit_message>
<xml_diff>
--- a/teaching/CS472/Timetable/LLM.pptx
+++ b/teaching/CS472/Timetable/LLM.pptx
@@ -5,15 +5,16 @@
     <p:sldMasterId id="2147483648" r:id="rId1"/>
   </p:sldMasterIdLst>
   <p:notesMasterIdLst>
-    <p:notesMasterId r:id="rId8"/>
+    <p:notesMasterId r:id="rId9"/>
   </p:notesMasterIdLst>
   <p:sldIdLst>
     <p:sldId id="256" r:id="rId2"/>
     <p:sldId id="257" r:id="rId3"/>
     <p:sldId id="258" r:id="rId4"/>
     <p:sldId id="259" r:id="rId5"/>
-    <p:sldId id="261" r:id="rId6"/>
-    <p:sldId id="260" r:id="rId7"/>
+    <p:sldId id="262" r:id="rId6"/>
+    <p:sldId id="261" r:id="rId7"/>
+    <p:sldId id="260" r:id="rId8"/>
   </p:sldIdLst>
   <p:sldSz cx="12192000" cy="6858000"/>
   <p:notesSz cx="6858000" cy="9144000"/>
@@ -112,6 +113,11 @@
       </a:defRPr>
     </a:lvl9pPr>
   </p:defaultTextStyle>
+  <p:extLst>
+    <p:ext uri="{EFAFB233-063F-42B5-8137-9DF3F51BA10A}">
+      <p15:sldGuideLst xmlns:p15="http://schemas.microsoft.com/office/powerpoint/2012/main"/>
+    </p:ext>
+  </p:extLst>
 </p:presentation>
 </file>
 
@@ -197,7 +203,7 @@
           <a:p>
             <a:fld id="{5BAF2D54-6202-E54A-A0D1-8207B5B01C7A}" type="datetimeFigureOut">
               <a:rPr lang="en-US" smtClean="0"/>
-              <a:t>1/13/24</a:t>
+              <a:t>1/15/24</a:t>
             </a:fld>
             <a:endParaRPr lang="en-US"/>
           </a:p>
@@ -736,7 +742,7 @@
           <a:p>
             <a:fld id="{83E35761-B443-A74D-9BA5-3B6258AF7342}" type="slidenum">
               <a:rPr lang="en-US" smtClean="0"/>
-              <a:t>6</a:t>
+              <a:t>7</a:t>
             </a:fld>
             <a:endParaRPr lang="en-US"/>
           </a:p>
@@ -904,7 +910,7 @@
           <a:p>
             <a:fld id="{1B322CE5-0016-994A-A0D0-1AC6E2C9C5AB}" type="datetimeFigureOut">
               <a:rPr lang="en-BE" smtClean="0"/>
-              <a:t>12/01/2024</a:t>
+              <a:t>15/01/2024</a:t>
             </a:fld>
             <a:endParaRPr lang="en-BE"/>
           </a:p>
@@ -1104,7 +1110,7 @@
           <a:p>
             <a:fld id="{1B322CE5-0016-994A-A0D0-1AC6E2C9C5AB}" type="datetimeFigureOut">
               <a:rPr lang="en-BE" smtClean="0"/>
-              <a:t>12/01/2024</a:t>
+              <a:t>15/01/2024</a:t>
             </a:fld>
             <a:endParaRPr lang="en-BE"/>
           </a:p>
@@ -1314,7 +1320,7 @@
           <a:p>
             <a:fld id="{1B322CE5-0016-994A-A0D0-1AC6E2C9C5AB}" type="datetimeFigureOut">
               <a:rPr lang="en-BE" smtClean="0"/>
-              <a:t>12/01/2024</a:t>
+              <a:t>15/01/2024</a:t>
             </a:fld>
             <a:endParaRPr lang="en-BE"/>
           </a:p>
@@ -1514,7 +1520,7 @@
           <a:p>
             <a:fld id="{1B322CE5-0016-994A-A0D0-1AC6E2C9C5AB}" type="datetimeFigureOut">
               <a:rPr lang="en-BE" smtClean="0"/>
-              <a:t>12/01/2024</a:t>
+              <a:t>15/01/2024</a:t>
             </a:fld>
             <a:endParaRPr lang="en-BE"/>
           </a:p>
@@ -1790,7 +1796,7 @@
           <a:p>
             <a:fld id="{1B322CE5-0016-994A-A0D0-1AC6E2C9C5AB}" type="datetimeFigureOut">
               <a:rPr lang="en-BE" smtClean="0"/>
-              <a:t>12/01/2024</a:t>
+              <a:t>15/01/2024</a:t>
             </a:fld>
             <a:endParaRPr lang="en-BE"/>
           </a:p>
@@ -2058,7 +2064,7 @@
           <a:p>
             <a:fld id="{1B322CE5-0016-994A-A0D0-1AC6E2C9C5AB}" type="datetimeFigureOut">
               <a:rPr lang="en-BE" smtClean="0"/>
-              <a:t>12/01/2024</a:t>
+              <a:t>15/01/2024</a:t>
             </a:fld>
             <a:endParaRPr lang="en-BE"/>
           </a:p>
@@ -2473,7 +2479,7 @@
           <a:p>
             <a:fld id="{1B322CE5-0016-994A-A0D0-1AC6E2C9C5AB}" type="datetimeFigureOut">
               <a:rPr lang="en-BE" smtClean="0"/>
-              <a:t>12/01/2024</a:t>
+              <a:t>15/01/2024</a:t>
             </a:fld>
             <a:endParaRPr lang="en-BE"/>
           </a:p>
@@ -2615,7 +2621,7 @@
           <a:p>
             <a:fld id="{1B322CE5-0016-994A-A0D0-1AC6E2C9C5AB}" type="datetimeFigureOut">
               <a:rPr lang="en-BE" smtClean="0"/>
-              <a:t>12/01/2024</a:t>
+              <a:t>15/01/2024</a:t>
             </a:fld>
             <a:endParaRPr lang="en-BE"/>
           </a:p>
@@ -2728,7 +2734,7 @@
           <a:p>
             <a:fld id="{1B322CE5-0016-994A-A0D0-1AC6E2C9C5AB}" type="datetimeFigureOut">
               <a:rPr lang="en-BE" smtClean="0"/>
-              <a:t>12/01/2024</a:t>
+              <a:t>15/01/2024</a:t>
             </a:fld>
             <a:endParaRPr lang="en-BE"/>
           </a:p>
@@ -3041,7 +3047,7 @@
           <a:p>
             <a:fld id="{1B322CE5-0016-994A-A0D0-1AC6E2C9C5AB}" type="datetimeFigureOut">
               <a:rPr lang="en-BE" smtClean="0"/>
-              <a:t>12/01/2024</a:t>
+              <a:t>15/01/2024</a:t>
             </a:fld>
             <a:endParaRPr lang="en-BE"/>
           </a:p>
@@ -3330,7 +3336,7 @@
           <a:p>
             <a:fld id="{1B322CE5-0016-994A-A0D0-1AC6E2C9C5AB}" type="datetimeFigureOut">
               <a:rPr lang="en-BE" smtClean="0"/>
-              <a:t>12/01/2024</a:t>
+              <a:t>15/01/2024</a:t>
             </a:fld>
             <a:endParaRPr lang="en-BE"/>
           </a:p>
@@ -3573,7 +3579,7 @@
           <a:p>
             <a:fld id="{1B322CE5-0016-994A-A0D0-1AC6E2C9C5AB}" type="datetimeFigureOut">
               <a:rPr lang="en-BE" smtClean="0"/>
-              <a:t>12/01/2024</a:t>
+              <a:t>15/01/2024</a:t>
             </a:fld>
             <a:endParaRPr lang="en-BE"/>
           </a:p>
@@ -5287,7 +5293,7 @@
       </p:par>
     </p:tnLst>
     <p:bldLst>
-      <p:bldP spid="8" grpId="0"/>
+      <p:bldP spid="8" grpId="0" animBg="1"/>
     </p:bldLst>
   </p:timing>
 </p:sld>
@@ -5312,31 +5318,50 @@
       </p:grpSpPr>
       <p:sp>
         <p:nvSpPr>
-          <p:cNvPr id="6" name="Title 1">
-            <a:extLst>
-              <a:ext uri="{FF2B5EF4-FFF2-40B4-BE49-F238E27FC236}">
-                <a16:creationId xmlns:a16="http://schemas.microsoft.com/office/drawing/2014/main" id="{25A082F2-F51D-C1CC-A0DD-EA7C5A31D3BF}"/>
-              </a:ext>
-            </a:extLst>
-          </p:cNvPr>
-          <p:cNvSpPr>
-            <a:spLocks noGrp="1"/>
-          </p:cNvSpPr>
-          <p:nvPr>
-            <p:ph type="title"/>
-          </p:nvPr>
+          <p:cNvPr id="4" name="Title 1">
+            <a:extLst>
+              <a:ext uri="{FF2B5EF4-FFF2-40B4-BE49-F238E27FC236}">
+                <a16:creationId xmlns:a16="http://schemas.microsoft.com/office/drawing/2014/main" id="{90809E48-9343-6DD5-FDFF-62FF7162C3DA}"/>
+              </a:ext>
+            </a:extLst>
+          </p:cNvPr>
+          <p:cNvSpPr txBox="1">
+            <a:spLocks/>
+          </p:cNvSpPr>
+          <p:nvPr/>
         </p:nvSpPr>
         <p:spPr>
           <a:xfrm>
-            <a:off x="639418" y="0"/>
+            <a:off x="838200" y="2597426"/>
             <a:ext cx="10515600" cy="967409"/>
           </a:xfrm>
+          <a:prstGeom prst="rect">
+            <a:avLst/>
+          </a:prstGeom>
         </p:spPr>
         <p:txBody>
-          <a:bodyPr>
+          <a:bodyPr vert="horz" lIns="91440" tIns="45720" rIns="91440" bIns="45720" rtlCol="0" anchor="ctr">
             <a:normAutofit/>
           </a:bodyPr>
-          <a:lstStyle/>
+          <a:lstStyle>
+            <a:lvl1pPr algn="l" defTabSz="914400" rtl="0" eaLnBrk="1" latinLnBrk="0" hangingPunct="1">
+              <a:lnSpc>
+                <a:spcPct val="90000"/>
+              </a:lnSpc>
+              <a:spcBef>
+                <a:spcPct val="0"/>
+              </a:spcBef>
+              <a:buNone/>
+              <a:defRPr sz="4400" kern="1200">
+                <a:solidFill>
+                  <a:schemeClr val="tx1"/>
+                </a:solidFill>
+                <a:latin typeface="+mj-lt"/>
+                <a:ea typeface="+mj-ea"/>
+                <a:cs typeface="+mj-cs"/>
+              </a:defRPr>
+            </a:lvl1pPr>
+          </a:lstStyle>
           <a:p>
             <a:r>
               <a:rPr lang="en-US" sz="3600" dirty="0"/>
@@ -5353,12 +5378,72 @@
           </a:p>
         </p:txBody>
       </p:sp>
+    </p:spTree>
+    <p:extLst>
+      <p:ext uri="{BB962C8B-B14F-4D97-AF65-F5344CB8AC3E}">
+        <p14:creationId xmlns:p14="http://schemas.microsoft.com/office/powerpoint/2010/main" val="2127759097"/>
+      </p:ext>
+    </p:extLst>
+  </p:cSld>
+  <p:clrMapOvr>
+    <a:masterClrMapping/>
+  </p:clrMapOvr>
+</p:sld>
+</file>
+
+<file path=ppt/slides/slide6.xml><?xml version="1.0" encoding="utf-8"?>
+<p:sld xmlns:a="http://schemas.openxmlformats.org/drawingml/2006/main" xmlns:r="http://schemas.openxmlformats.org/officeDocument/2006/relationships" xmlns:p="http://schemas.openxmlformats.org/presentationml/2006/main">
+  <p:cSld>
+    <p:spTree>
+      <p:nvGrpSpPr>
+        <p:cNvPr id="1" name=""/>
+        <p:cNvGrpSpPr/>
+        <p:nvPr/>
+      </p:nvGrpSpPr>
+      <p:grpSpPr>
+        <a:xfrm>
+          <a:off x="0" y="0"/>
+          <a:ext cx="0" cy="0"/>
+          <a:chOff x="0" y="0"/>
+          <a:chExt cx="0" cy="0"/>
+        </a:xfrm>
+      </p:grpSpPr>
       <p:pic>
         <p:nvPicPr>
-          <p:cNvPr id="2050" name="Picture 2" descr="ShareChatGPTConversations">
-            <a:extLst>
-              <a:ext uri="{FF2B5EF4-FFF2-40B4-BE49-F238E27FC236}">
-                <a16:creationId xmlns:a16="http://schemas.microsoft.com/office/drawing/2014/main" id="{5981A190-58B1-03B1-7850-A8DAA731E4C8}"/>
+          <p:cNvPr id="13" name="Picture 12">
+            <a:extLst>
+              <a:ext uri="{FF2B5EF4-FFF2-40B4-BE49-F238E27FC236}">
+                <a16:creationId xmlns:a16="http://schemas.microsoft.com/office/drawing/2014/main" id="{E444E48F-9DEB-BC58-4F67-E272DD7FD280}"/>
+              </a:ext>
+            </a:extLst>
+          </p:cNvPr>
+          <p:cNvPicPr>
+            <a:picLocks noChangeAspect="1"/>
+          </p:cNvPicPr>
+          <p:nvPr/>
+        </p:nvPicPr>
+        <p:blipFill>
+          <a:blip r:embed="rId2"/>
+          <a:stretch>
+            <a:fillRect/>
+          </a:stretch>
+        </p:blipFill>
+        <p:spPr>
+          <a:xfrm>
+            <a:off x="1099586" y="522581"/>
+            <a:ext cx="8056719" cy="880694"/>
+          </a:xfrm>
+          <a:prstGeom prst="rect">
+            <a:avLst/>
+          </a:prstGeom>
+        </p:spPr>
+      </p:pic>
+      <p:pic>
+        <p:nvPicPr>
+          <p:cNvPr id="2" name="Picture 2" descr="ShareChatGPTConversations">
+            <a:extLst>
+              <a:ext uri="{FF2B5EF4-FFF2-40B4-BE49-F238E27FC236}">
+                <a16:creationId xmlns:a16="http://schemas.microsoft.com/office/drawing/2014/main" id="{E10D5A26-877E-C87A-6016-9F2370BED396}"/>
               </a:ext>
             </a:extLst>
           </p:cNvPr>
@@ -5368,7 +5453,7 @@
           <p:nvPr/>
         </p:nvPicPr>
         <p:blipFill>
-          <a:blip r:embed="rId2">
+          <a:blip r:embed="rId3">
             <a:extLst>
               <a:ext uri="{28A0092B-C50C-407E-A947-70E740481C1C}">
                 <a14:useLocalDpi xmlns:a14="http://schemas.microsoft.com/office/drawing/2010/main" val="0"/>
@@ -5382,8 +5467,8 @@
         </p:blipFill>
         <p:spPr bwMode="auto">
           <a:xfrm>
-            <a:off x="1311621" y="2597427"/>
-            <a:ext cx="4585597" cy="3595242"/>
+            <a:off x="1099586" y="1554436"/>
+            <a:ext cx="10138601" cy="4166331"/>
           </a:xfrm>
           <a:prstGeom prst="rect">
             <a:avLst/>
@@ -5400,76 +5485,333 @@
           </a:extLst>
         </p:spPr>
       </p:pic>
-      <p:sp>
-        <p:nvSpPr>
-          <p:cNvPr id="11" name="TextBox 10">
-            <a:extLst>
-              <a:ext uri="{FF2B5EF4-FFF2-40B4-BE49-F238E27FC236}">
-                <a16:creationId xmlns:a16="http://schemas.microsoft.com/office/drawing/2014/main" id="{0F194971-2ED3-6A25-C6E2-AFDA29D6099D}"/>
-              </a:ext>
-            </a:extLst>
-          </p:cNvPr>
-          <p:cNvSpPr txBox="1"/>
+      <p:pic>
+        <p:nvPicPr>
+          <p:cNvPr id="3" name="Picture 2" descr="ShareChatGPTConversations">
+            <a:extLst>
+              <a:ext uri="{FF2B5EF4-FFF2-40B4-BE49-F238E27FC236}">
+                <a16:creationId xmlns:a16="http://schemas.microsoft.com/office/drawing/2014/main" id="{4B755522-E6AB-CD3B-DDBE-029A4379E5FC}"/>
+              </a:ext>
+            </a:extLst>
+          </p:cNvPr>
+          <p:cNvPicPr>
+            <a:picLocks noChangeAspect="1" noChangeArrowheads="1"/>
+          </p:cNvPicPr>
           <p:nvPr/>
-        </p:nvSpPr>
-        <p:spPr>
+        </p:nvPicPr>
+        <p:blipFill>
+          <a:blip r:embed="rId4">
+            <a:extLst>
+              <a:ext uri="{28A0092B-C50C-407E-A947-70E740481C1C}">
+                <a14:useLocalDpi xmlns:a14="http://schemas.microsoft.com/office/drawing/2010/main" val="0"/>
+              </a:ext>
+            </a:extLst>
+          </a:blip>
+          <a:srcRect/>
+          <a:stretch>
+            <a:fillRect/>
+          </a:stretch>
+        </p:blipFill>
+        <p:spPr bwMode="auto">
           <a:xfrm>
-            <a:off x="781878" y="1060174"/>
-            <a:ext cx="9594574" cy="461665"/>
+            <a:off x="953813" y="3572012"/>
+            <a:ext cx="3896483" cy="3054956"/>
           </a:xfrm>
           <a:prstGeom prst="rect">
             <a:avLst/>
           </a:prstGeom>
           <a:noFill/>
-        </p:spPr>
-        <p:txBody>
-          <a:bodyPr wrap="square" rtlCol="0">
-            <a:spAutoFit/>
-          </a:bodyPr>
-          <a:lstStyle/>
-          <a:p>
-            <a:r>
-              <a:rPr lang="en-US" sz="2400" dirty="0"/>
-              <a:t>We will look at some concrete examples from the LLM - </a:t>
-            </a:r>
-            <a:r>
-              <a:rPr lang="en-US" sz="2400" dirty="0" err="1"/>
-              <a:t>ChatGPT</a:t>
-            </a:r>
-            <a:endParaRPr lang="en-US" sz="2400" dirty="0"/>
-          </a:p>
-        </p:txBody>
-      </p:sp>
-      <p:pic>
-        <p:nvPicPr>
-          <p:cNvPr id="13" name="Picture 12">
-            <a:extLst>
-              <a:ext uri="{FF2B5EF4-FFF2-40B4-BE49-F238E27FC236}">
-                <a16:creationId xmlns:a16="http://schemas.microsoft.com/office/drawing/2014/main" id="{E444E48F-9DEB-BC58-4F67-E272DD7FD280}"/>
-              </a:ext>
-            </a:extLst>
-          </p:cNvPr>
-          <p:cNvPicPr>
-            <a:picLocks noChangeAspect="1"/>
-          </p:cNvPicPr>
-          <p:nvPr/>
-        </p:nvPicPr>
-        <p:blipFill>
-          <a:blip r:embed="rId3"/>
-          <a:stretch>
-            <a:fillRect/>
-          </a:stretch>
-        </p:blipFill>
-        <p:spPr>
-          <a:xfrm>
-            <a:off x="1311621" y="1614604"/>
-            <a:ext cx="8056719" cy="880694"/>
-          </a:xfrm>
-          <a:prstGeom prst="rect">
-            <a:avLst/>
-          </a:prstGeom>
+          <a:extLst>
+            <a:ext uri="{909E8E84-426E-40DD-AFC4-6F175D3DCCD1}">
+              <a14:hiddenFill xmlns:a14="http://schemas.microsoft.com/office/drawing/2010/main">
+                <a:solidFill>
+                  <a:srgbClr val="FFFFFF"/>
+                </a:solidFill>
+              </a14:hiddenFill>
+            </a:ext>
+          </a:extLst>
         </p:spPr>
       </p:pic>
+      <p:grpSp>
+        <p:nvGrpSpPr>
+          <p:cNvPr id="9" name="Group 8">
+            <a:extLst>
+              <a:ext uri="{FF2B5EF4-FFF2-40B4-BE49-F238E27FC236}">
+                <a16:creationId xmlns:a16="http://schemas.microsoft.com/office/drawing/2014/main" id="{45DE329A-A18B-9E6F-29EA-B9DD434002CE}"/>
+              </a:ext>
+            </a:extLst>
+          </p:cNvPr>
+          <p:cNvGrpSpPr/>
+          <p:nvPr/>
+        </p:nvGrpSpPr>
+        <p:grpSpPr>
+          <a:xfrm>
+            <a:off x="4727369" y="2292622"/>
+            <a:ext cx="4545838" cy="2845234"/>
+            <a:chOff x="4727369" y="1934817"/>
+            <a:chExt cx="4545838" cy="2845234"/>
+          </a:xfrm>
+        </p:grpSpPr>
+        <p:sp>
+          <p:nvSpPr>
+            <p:cNvPr id="7" name="Rounded Rectangle 6">
+              <a:extLst>
+                <a:ext uri="{FF2B5EF4-FFF2-40B4-BE49-F238E27FC236}">
+                  <a16:creationId xmlns:a16="http://schemas.microsoft.com/office/drawing/2014/main" id="{3049501B-5A04-2013-DCF3-8AD7D5BEFF15}"/>
+                </a:ext>
+              </a:extLst>
+            </p:cNvPr>
+            <p:cNvSpPr/>
+            <p:nvPr/>
+          </p:nvSpPr>
+          <p:spPr>
+            <a:xfrm>
+              <a:off x="6215270" y="1934817"/>
+              <a:ext cx="3057937" cy="2845234"/>
+            </a:xfrm>
+            <a:prstGeom prst="roundRect">
+              <a:avLst/>
+            </a:prstGeom>
+            <a:noFill/>
+            <a:ln w="28575">
+              <a:solidFill>
+                <a:schemeClr val="tx1"/>
+              </a:solidFill>
+            </a:ln>
+          </p:spPr>
+          <p:style>
+            <a:lnRef idx="2">
+              <a:schemeClr val="accent1">
+                <a:shade val="15000"/>
+              </a:schemeClr>
+            </a:lnRef>
+            <a:fillRef idx="1">
+              <a:schemeClr val="accent1"/>
+            </a:fillRef>
+            <a:effectRef idx="0">
+              <a:schemeClr val="accent1"/>
+            </a:effectRef>
+            <a:fontRef idx="minor">
+              <a:schemeClr val="lt1"/>
+            </a:fontRef>
+          </p:style>
+          <p:txBody>
+            <a:bodyPr rtlCol="0" anchor="ctr"/>
+            <a:lstStyle/>
+            <a:p>
+              <a:pPr algn="ctr"/>
+              <a:endParaRPr lang="en-US" dirty="0"/>
+            </a:p>
+          </p:txBody>
+        </p:sp>
+        <p:sp>
+          <p:nvSpPr>
+            <p:cNvPr id="8" name="Right Arrow 7">
+              <a:extLst>
+                <a:ext uri="{FF2B5EF4-FFF2-40B4-BE49-F238E27FC236}">
+                  <a16:creationId xmlns:a16="http://schemas.microsoft.com/office/drawing/2014/main" id="{A92BCE7C-8FC1-4424-2CA2-A321863A6BC3}"/>
+                </a:ext>
+              </a:extLst>
+            </p:cNvPr>
+            <p:cNvSpPr/>
+            <p:nvPr/>
+          </p:nvSpPr>
+          <p:spPr>
+            <a:xfrm>
+              <a:off x="4727369" y="3891241"/>
+              <a:ext cx="1249361" cy="382955"/>
+            </a:xfrm>
+            <a:prstGeom prst="rightArrow">
+              <a:avLst/>
+            </a:prstGeom>
+            <a:solidFill>
+              <a:schemeClr val="tx1"/>
+            </a:solidFill>
+          </p:spPr>
+          <p:style>
+            <a:lnRef idx="2">
+              <a:schemeClr val="accent1">
+                <a:shade val="15000"/>
+              </a:schemeClr>
+            </a:lnRef>
+            <a:fillRef idx="1">
+              <a:schemeClr val="accent1"/>
+            </a:fillRef>
+            <a:effectRef idx="0">
+              <a:schemeClr val="accent1"/>
+            </a:effectRef>
+            <a:fontRef idx="minor">
+              <a:schemeClr val="lt1"/>
+            </a:fontRef>
+          </p:style>
+          <p:txBody>
+            <a:bodyPr rtlCol="0" anchor="ctr"/>
+            <a:lstStyle/>
+            <a:p>
+              <a:pPr algn="ctr"/>
+              <a:endParaRPr lang="en-US" dirty="0"/>
+            </a:p>
+          </p:txBody>
+        </p:sp>
+      </p:grpSp>
+      <p:grpSp>
+        <p:nvGrpSpPr>
+          <p:cNvPr id="16" name="Group 15">
+            <a:extLst>
+              <a:ext uri="{FF2B5EF4-FFF2-40B4-BE49-F238E27FC236}">
+                <a16:creationId xmlns:a16="http://schemas.microsoft.com/office/drawing/2014/main" id="{DCFF0A35-085C-703D-11B7-CA39DDBC9F29}"/>
+              </a:ext>
+            </a:extLst>
+          </p:cNvPr>
+          <p:cNvGrpSpPr/>
+          <p:nvPr/>
+        </p:nvGrpSpPr>
+        <p:grpSpPr>
+          <a:xfrm>
+            <a:off x="2160104" y="384314"/>
+            <a:ext cx="5367131" cy="742122"/>
+            <a:chOff x="2160104" y="92765"/>
+            <a:chExt cx="5367131" cy="742122"/>
+          </a:xfrm>
+        </p:grpSpPr>
+        <p:sp>
+          <p:nvSpPr>
+            <p:cNvPr id="10" name="Rounded Rectangle 9">
+              <a:extLst>
+                <a:ext uri="{FF2B5EF4-FFF2-40B4-BE49-F238E27FC236}">
+                  <a16:creationId xmlns:a16="http://schemas.microsoft.com/office/drawing/2014/main" id="{4F13B296-233F-673D-EBBC-93647DF3419B}"/>
+                </a:ext>
+              </a:extLst>
+            </p:cNvPr>
+            <p:cNvSpPr/>
+            <p:nvPr/>
+          </p:nvSpPr>
+          <p:spPr>
+            <a:xfrm>
+              <a:off x="2160104" y="530087"/>
+              <a:ext cx="861392" cy="304800"/>
+            </a:xfrm>
+            <a:prstGeom prst="roundRect">
+              <a:avLst/>
+            </a:prstGeom>
+            <a:noFill/>
+            <a:ln w="28575">
+              <a:solidFill>
+                <a:srgbClr val="C00000"/>
+              </a:solidFill>
+            </a:ln>
+          </p:spPr>
+          <p:style>
+            <a:lnRef idx="2">
+              <a:schemeClr val="accent1">
+                <a:shade val="15000"/>
+              </a:schemeClr>
+            </a:lnRef>
+            <a:fillRef idx="1">
+              <a:schemeClr val="accent1"/>
+            </a:fillRef>
+            <a:effectRef idx="0">
+              <a:schemeClr val="accent1"/>
+            </a:effectRef>
+            <a:fontRef idx="minor">
+              <a:schemeClr val="lt1"/>
+            </a:fontRef>
+          </p:style>
+          <p:txBody>
+            <a:bodyPr rtlCol="0" anchor="ctr"/>
+            <a:lstStyle/>
+            <a:p>
+              <a:pPr algn="ctr"/>
+              <a:endParaRPr lang="en-US"/>
+            </a:p>
+          </p:txBody>
+        </p:sp>
+        <p:sp>
+          <p:nvSpPr>
+            <p:cNvPr id="12" name="TextBox 11">
+              <a:extLst>
+                <a:ext uri="{FF2B5EF4-FFF2-40B4-BE49-F238E27FC236}">
+                  <a16:creationId xmlns:a16="http://schemas.microsoft.com/office/drawing/2014/main" id="{245BBAB6-7A68-2A0B-BDDA-F5A7A71F6597}"/>
+                </a:ext>
+              </a:extLst>
+            </p:cNvPr>
+            <p:cNvSpPr txBox="1"/>
+            <p:nvPr/>
+          </p:nvSpPr>
+          <p:spPr>
+            <a:xfrm>
+              <a:off x="3127513" y="92765"/>
+              <a:ext cx="4399722" cy="369332"/>
+            </a:xfrm>
+            <a:prstGeom prst="rect">
+              <a:avLst/>
+            </a:prstGeom>
+            <a:noFill/>
+            <a:ln w="28575">
+              <a:solidFill>
+                <a:srgbClr val="C00000"/>
+              </a:solidFill>
+            </a:ln>
+          </p:spPr>
+          <p:txBody>
+            <a:bodyPr wrap="square" rtlCol="0">
+              <a:spAutoFit/>
+            </a:bodyPr>
+            <a:lstStyle/>
+            <a:p>
+              <a:r>
+                <a:rPr lang="en-US" b="1" dirty="0"/>
+                <a:t>Software maintenance – Code duplication</a:t>
+              </a:r>
+            </a:p>
+          </p:txBody>
+        </p:sp>
+        <p:cxnSp>
+          <p:nvCxnSpPr>
+            <p:cNvPr id="15" name="Straight Arrow Connector 14">
+              <a:extLst>
+                <a:ext uri="{FF2B5EF4-FFF2-40B4-BE49-F238E27FC236}">
+                  <a16:creationId xmlns:a16="http://schemas.microsoft.com/office/drawing/2014/main" id="{37D4FFEB-B466-EEA4-F507-1ABC2EAB28C4}"/>
+                </a:ext>
+              </a:extLst>
+            </p:cNvPr>
+            <p:cNvCxnSpPr>
+              <a:stCxn id="12" idx="1"/>
+              <a:endCxn id="10" idx="0"/>
+            </p:cNvCxnSpPr>
+            <p:nvPr/>
+          </p:nvCxnSpPr>
+          <p:spPr>
+            <a:xfrm flipH="1">
+              <a:off x="2590800" y="277431"/>
+              <a:ext cx="536713" cy="252656"/>
+            </a:xfrm>
+            <a:prstGeom prst="straightConnector1">
+              <a:avLst/>
+            </a:prstGeom>
+            <a:ln w="38100">
+              <a:solidFill>
+                <a:srgbClr val="C00000"/>
+              </a:solidFill>
+              <a:tailEnd type="triangle"/>
+            </a:ln>
+          </p:spPr>
+          <p:style>
+            <a:lnRef idx="1">
+              <a:schemeClr val="accent1"/>
+            </a:lnRef>
+            <a:fillRef idx="0">
+              <a:schemeClr val="accent1"/>
+            </a:fillRef>
+            <a:effectRef idx="0">
+              <a:schemeClr val="accent1"/>
+            </a:effectRef>
+            <a:fontRef idx="minor">
+              <a:schemeClr val="tx1"/>
+            </a:fontRef>
+          </p:style>
+        </p:cxnSp>
+      </p:grpSp>
     </p:spTree>
     <p:extLst>
       <p:ext uri="{BB962C8B-B14F-4D97-AF65-F5344CB8AC3E}">
@@ -5480,10 +5822,228 @@
   <p:clrMapOvr>
     <a:masterClrMapping/>
   </p:clrMapOvr>
+  <p:timing>
+    <p:tnLst>
+      <p:par>
+        <p:cTn id="1" dur="indefinite" restart="never" nodeType="tmRoot">
+          <p:childTnLst>
+            <p:seq concurrent="1" nextAc="seek">
+              <p:cTn id="2" dur="indefinite" nodeType="mainSeq">
+                <p:childTnLst>
+                  <p:par>
+                    <p:cTn id="3" fill="hold">
+                      <p:stCondLst>
+                        <p:cond delay="indefinite"/>
+                      </p:stCondLst>
+                      <p:childTnLst>
+                        <p:par>
+                          <p:cTn id="4" fill="hold">
+                            <p:stCondLst>
+                              <p:cond delay="0"/>
+                            </p:stCondLst>
+                            <p:childTnLst>
+                              <p:par>
+                                <p:cTn id="5" presetID="1" presetClass="entr" presetSubtype="0" fill="hold" nodeType="clickEffect">
+                                  <p:stCondLst>
+                                    <p:cond delay="0"/>
+                                  </p:stCondLst>
+                                  <p:childTnLst>
+                                    <p:set>
+                                      <p:cBhvr>
+                                        <p:cTn id="6" dur="1" fill="hold">
+                                          <p:stCondLst>
+                                            <p:cond delay="0"/>
+                                          </p:stCondLst>
+                                        </p:cTn>
+                                        <p:tgtEl>
+                                          <p:spTgt spid="3"/>
+                                        </p:tgtEl>
+                                        <p:attrNameLst>
+                                          <p:attrName>style.visibility</p:attrName>
+                                        </p:attrNameLst>
+                                      </p:cBhvr>
+                                      <p:to>
+                                        <p:strVal val="visible"/>
+                                      </p:to>
+                                    </p:set>
+                                  </p:childTnLst>
+                                </p:cTn>
+                              </p:par>
+                            </p:childTnLst>
+                          </p:cTn>
+                        </p:par>
+                      </p:childTnLst>
+                    </p:cTn>
+                  </p:par>
+                  <p:par>
+                    <p:cTn id="7" fill="hold">
+                      <p:stCondLst>
+                        <p:cond delay="indefinite"/>
+                      </p:stCondLst>
+                      <p:childTnLst>
+                        <p:par>
+                          <p:cTn id="8" fill="hold">
+                            <p:stCondLst>
+                              <p:cond delay="0"/>
+                            </p:stCondLst>
+                            <p:childTnLst>
+                              <p:par>
+                                <p:cTn id="9" presetID="1" presetClass="entr" presetSubtype="0" fill="hold" nodeType="clickEffect">
+                                  <p:stCondLst>
+                                    <p:cond delay="0"/>
+                                  </p:stCondLst>
+                                  <p:childTnLst>
+                                    <p:set>
+                                      <p:cBhvr>
+                                        <p:cTn id="10" dur="1" fill="hold">
+                                          <p:stCondLst>
+                                            <p:cond delay="0"/>
+                                          </p:stCondLst>
+                                        </p:cTn>
+                                        <p:tgtEl>
+                                          <p:spTgt spid="2"/>
+                                        </p:tgtEl>
+                                        <p:attrNameLst>
+                                          <p:attrName>style.visibility</p:attrName>
+                                        </p:attrNameLst>
+                                      </p:cBhvr>
+                                      <p:to>
+                                        <p:strVal val="visible"/>
+                                      </p:to>
+                                    </p:set>
+                                  </p:childTnLst>
+                                </p:cTn>
+                              </p:par>
+                            </p:childTnLst>
+                          </p:cTn>
+                        </p:par>
+                      </p:childTnLst>
+                    </p:cTn>
+                  </p:par>
+                  <p:par>
+                    <p:cTn id="11" fill="hold">
+                      <p:stCondLst>
+                        <p:cond delay="indefinite"/>
+                      </p:stCondLst>
+                      <p:childTnLst>
+                        <p:par>
+                          <p:cTn id="12" fill="hold">
+                            <p:stCondLst>
+                              <p:cond delay="0"/>
+                            </p:stCondLst>
+                            <p:childTnLst>
+                              <p:par>
+                                <p:cTn id="13" presetID="1" presetClass="entr" presetSubtype="0" fill="hold" nodeType="clickEffect">
+                                  <p:stCondLst>
+                                    <p:cond delay="0"/>
+                                  </p:stCondLst>
+                                  <p:childTnLst>
+                                    <p:set>
+                                      <p:cBhvr>
+                                        <p:cTn id="14" dur="1" fill="hold">
+                                          <p:stCondLst>
+                                            <p:cond delay="0"/>
+                                          </p:stCondLst>
+                                        </p:cTn>
+                                        <p:tgtEl>
+                                          <p:spTgt spid="9"/>
+                                        </p:tgtEl>
+                                        <p:attrNameLst>
+                                          <p:attrName>style.visibility</p:attrName>
+                                        </p:attrNameLst>
+                                      </p:cBhvr>
+                                      <p:to>
+                                        <p:strVal val="visible"/>
+                                      </p:to>
+                                    </p:set>
+                                  </p:childTnLst>
+                                </p:cTn>
+                              </p:par>
+                            </p:childTnLst>
+                          </p:cTn>
+                        </p:par>
+                      </p:childTnLst>
+                    </p:cTn>
+                  </p:par>
+                  <p:par>
+                    <p:cTn id="15" fill="hold">
+                      <p:stCondLst>
+                        <p:cond delay="indefinite"/>
+                      </p:stCondLst>
+                      <p:childTnLst>
+                        <p:par>
+                          <p:cTn id="16" fill="hold">
+                            <p:stCondLst>
+                              <p:cond delay="0"/>
+                            </p:stCondLst>
+                            <p:childTnLst>
+                              <p:par>
+                                <p:cTn id="17" presetID="9" presetClass="entr" presetSubtype="0" fill="hold" nodeType="clickEffect">
+                                  <p:stCondLst>
+                                    <p:cond delay="0"/>
+                                  </p:stCondLst>
+                                  <p:childTnLst>
+                                    <p:set>
+                                      <p:cBhvr>
+                                        <p:cTn id="18" dur="1" fill="hold">
+                                          <p:stCondLst>
+                                            <p:cond delay="0"/>
+                                          </p:stCondLst>
+                                        </p:cTn>
+                                        <p:tgtEl>
+                                          <p:spTgt spid="16"/>
+                                        </p:tgtEl>
+                                        <p:attrNameLst>
+                                          <p:attrName>style.visibility</p:attrName>
+                                        </p:attrNameLst>
+                                      </p:cBhvr>
+                                      <p:to>
+                                        <p:strVal val="visible"/>
+                                      </p:to>
+                                    </p:set>
+                                    <p:animEffect transition="in" filter="dissolve">
+                                      <p:cBhvr>
+                                        <p:cTn id="19" dur="500"/>
+                                        <p:tgtEl>
+                                          <p:spTgt spid="16"/>
+                                        </p:tgtEl>
+                                      </p:cBhvr>
+                                    </p:animEffect>
+                                  </p:childTnLst>
+                                </p:cTn>
+                              </p:par>
+                            </p:childTnLst>
+                          </p:cTn>
+                        </p:par>
+                      </p:childTnLst>
+                    </p:cTn>
+                  </p:par>
+                </p:childTnLst>
+              </p:cTn>
+              <p:prevCondLst>
+                <p:cond evt="onPrev" delay="0">
+                  <p:tgtEl>
+                    <p:sldTgt/>
+                  </p:tgtEl>
+                </p:cond>
+              </p:prevCondLst>
+              <p:nextCondLst>
+                <p:cond evt="onNext" delay="0">
+                  <p:tgtEl>
+                    <p:sldTgt/>
+                  </p:tgtEl>
+                </p:cond>
+              </p:nextCondLst>
+            </p:seq>
+          </p:childTnLst>
+        </p:cTn>
+      </p:par>
+    </p:tnLst>
+  </p:timing>
 </p:sld>
 </file>
 
-<file path=ppt/slides/slide6.xml><?xml version="1.0" encoding="utf-8"?>
+<file path=ppt/slides/slide7.xml><?xml version="1.0" encoding="utf-8"?>
 <p:sld xmlns:a="http://schemas.openxmlformats.org/drawingml/2006/main" xmlns:r="http://schemas.openxmlformats.org/officeDocument/2006/relationships" xmlns:p="http://schemas.openxmlformats.org/presentationml/2006/main">
   <p:cSld>
     <p:spTree>

</xml_diff>